<commit_message>
retouche de Objet definition
</commit_message>
<xml_diff>
--- a/java-oop latest.pptx
+++ b/java-oop latest.pptx
@@ -180,6 +180,7 @@
   <p1510:revLst>
     <p1510:client id="{18444539-B928-4433-9615-5883B10F92AF}" v="735" dt="2022-07-20T09:46:12.099"/>
     <p1510:client id="{22B0A339-FF1B-4DE5-A87E-38A812B5531B}" v="181" dt="2022-08-11T10:21:32.619"/>
+    <p1510:client id="{3041C01C-36D9-4668-959E-E05AB73D87E7}" v="71" dt="2022-08-18T10:51:23.798"/>
     <p1510:client id="{3C8466A4-5C93-4E44-BBD9-78E05F92B964}" v="64" dt="2022-08-17T16:02:16.582"/>
     <p1510:client id="{4A4B7DD8-6C49-438C-83AB-13A6DC5C1A94}" v="4875" dt="2022-07-20T17:10:01.006"/>
     <p1510:client id="{72D5D6BA-D37D-4C0A-ADD6-A22169968FF6}" v="190" dt="2022-08-17T12:51:47.509"/>
@@ -5194,13 +5195,13 @@
   <p:clrMapOvr>
     <a:masterClrMapping/>
   </p:clrMapOvr>
-  <mc:AlternateContent xmlns:mc="http://schemas.openxmlformats.org/markup-compatibility/2006">
-    <mc:Choice xmlns:p14="http://schemas.microsoft.com/office/powerpoint/2010/main" Requires="p14">
+  <mc:AlternateContent xmlns:mc="http://schemas.openxmlformats.org/markup-compatibility/2006" xmlns:p14="http://schemas.microsoft.com/office/powerpoint/2010/main">
+    <mc:Choice Requires="p14">
       <p:transition spd="slow" p14:dur="1500">
         <p:split orient="vert"/>
       </p:transition>
     </mc:Choice>
-    <mc:Fallback>
+    <mc:Fallback xmlns="">
       <p:transition spd="slow">
         <p:split orient="vert"/>
       </p:transition>
@@ -5586,13 +5587,13 @@
   <p:clrMapOvr>
     <a:masterClrMapping/>
   </p:clrMapOvr>
-  <mc:AlternateContent xmlns:mc="http://schemas.openxmlformats.org/markup-compatibility/2006">
-    <mc:Choice xmlns:p14="http://schemas.microsoft.com/office/powerpoint/2010/main" Requires="p14">
+  <mc:AlternateContent xmlns:mc="http://schemas.openxmlformats.org/markup-compatibility/2006" xmlns:p14="http://schemas.microsoft.com/office/powerpoint/2010/main">
+    <mc:Choice Requires="p14">
       <p:transition spd="slow" p14:dur="3400">
         <p14:reveal/>
       </p:transition>
     </mc:Choice>
-    <mc:Fallback>
+    <mc:Fallback xmlns="">
       <p:transition spd="slow">
         <p:fade/>
       </p:transition>
@@ -5752,13 +5753,13 @@
   <p:clrMapOvr>
     <a:masterClrMapping/>
   </p:clrMapOvr>
-  <mc:AlternateContent xmlns:mc="http://schemas.openxmlformats.org/markup-compatibility/2006">
-    <mc:Choice xmlns:p14="http://schemas.microsoft.com/office/powerpoint/2010/main" Requires="p14">
+  <mc:AlternateContent xmlns:mc="http://schemas.openxmlformats.org/markup-compatibility/2006" xmlns:p14="http://schemas.microsoft.com/office/powerpoint/2010/main">
+    <mc:Choice Requires="p14">
       <p:transition spd="med" p14:dur="700">
         <p:fade/>
       </p:transition>
     </mc:Choice>
-    <mc:Fallback>
+    <mc:Fallback xmlns="">
       <p:transition spd="med">
         <p:fade/>
       </p:transition>
@@ -6231,6 +6232,10 @@
             </a:r>
           </a:p>
           <a:p>
+            <a:pPr marL="342900" indent="-342900">
+              <a:buFont typeface="Wingdings" panose="05000000000000000000" pitchFamily="2" charset="2"/>
+              <a:buChar char="q"/>
+            </a:pPr>
             <a:endParaRPr lang="fr-FR" sz="2400" b="1" dirty="0">
               <a:effectLst>
                 <a:outerShdw blurRad="38100" dist="38100" dir="2700000" algn="tl">
@@ -6271,7 +6276,7 @@
                 <a:ea typeface="ＭＳ Ｐゴシック"/>
                 <a:cs typeface="Helvetica"/>
               </a:rPr>
-              <a:t>Un objet est une entité qui a un état et un comportement, par exemple: une chaise, une voiture etc.</a:t>
+              <a:t>Un objet est une entité qui a un état et un comportement, par exemple: une chaise, une voiture, un livre etc.</a:t>
             </a:r>
           </a:p>
           <a:p>
@@ -6281,7 +6286,7 @@
                 <a:ea typeface="ＭＳ Ｐゴシック"/>
                 <a:cs typeface="Helvetica"/>
               </a:rPr>
-              <a:t>Un objet a trois (3) caractéristiques:</a:t>
+              <a:t>On dit donc que l'objet a trois (3) caractéristiques:</a:t>
             </a:r>
           </a:p>
           <a:p>
@@ -6376,8 +6381,8 @@
         </p:blipFill>
         <p:spPr>
           <a:xfrm>
-            <a:off x="1484220" y="4047344"/>
-            <a:ext cx="5995870" cy="2713574"/>
+            <a:off x="1247738" y="4007930"/>
+            <a:ext cx="6298042" cy="2345712"/>
           </a:xfrm>
           <a:prstGeom prst="rect">
             <a:avLst/>

</xml_diff>

<commit_message>
Add heritages types images and end section
</commit_message>
<xml_diff>
--- a/java-oop latest.pptx
+++ b/java-oop latest.pptx
@@ -5,10 +5,10 @@
     <p:sldMasterId id="2147483650" r:id="rId1"/>
   </p:sldMasterIdLst>
   <p:notesMasterIdLst>
-    <p:notesMasterId r:id="rId19"/>
+    <p:notesMasterId r:id="rId21"/>
   </p:notesMasterIdLst>
   <p:handoutMasterIdLst>
-    <p:handoutMasterId r:id="rId20"/>
+    <p:handoutMasterId r:id="rId22"/>
   </p:handoutMasterIdLst>
   <p:sldIdLst>
     <p:sldId id="256" r:id="rId2"/>
@@ -26,8 +26,10 @@
     <p:sldId id="378" r:id="rId14"/>
     <p:sldId id="379" r:id="rId15"/>
     <p:sldId id="381" r:id="rId16"/>
-    <p:sldId id="366" r:id="rId17"/>
-    <p:sldId id="345" r:id="rId18"/>
+    <p:sldId id="382" r:id="rId17"/>
+    <p:sldId id="383" r:id="rId18"/>
+    <p:sldId id="366" r:id="rId19"/>
+    <p:sldId id="345" r:id="rId20"/>
   </p:sldIdLst>
   <p:sldSz cx="9144000" cy="6858000" type="screen4x3"/>
   <p:notesSz cx="7010400" cy="9296400"/>
@@ -186,7 +188,7 @@
     <p1510:client id="{22B0A339-FF1B-4DE5-A87E-38A812B5531B}" v="181" dt="2022-08-11T10:21:32.619"/>
     <p1510:client id="{3041C01C-36D9-4668-959E-E05AB73D87E7}" v="71" dt="2022-08-18T10:51:23.798"/>
     <p1510:client id="{3C8466A4-5C93-4E44-BBD9-78E05F92B964}" v="64" dt="2022-08-17T16:02:16.582"/>
-    <p1510:client id="{3E691BBC-5168-424C-B8A8-FE14B3E54A46}" v="71" dt="2022-08-18T13:06:30.251"/>
+    <p1510:client id="{3E691BBC-5168-424C-B8A8-FE14B3E54A46}" v="726" dt="2022-08-18T14:10:59.531"/>
     <p1510:client id="{4A4B7DD8-6C49-438C-83AB-13A6DC5C1A94}" v="4875" dt="2022-07-20T17:10:01.006"/>
     <p1510:client id="{72D5D6BA-D37D-4C0A-ADD6-A22169968FF6}" v="190" dt="2022-08-17T12:51:47.509"/>
     <p1510:client id="{88C564CE-DE1A-463A-8011-0D3EFC446075}" v="313" dt="2022-08-10T09:42:20.319"/>
@@ -5814,6 +5816,1532 @@
       </p:grpSpPr>
       <p:sp>
         <p:nvSpPr>
+          <p:cNvPr id="2" name="Titre 1"/>
+          <p:cNvSpPr>
+            <a:spLocks noGrp="1"/>
+          </p:cNvSpPr>
+          <p:nvPr>
+            <p:ph type="title"/>
+          </p:nvPr>
+        </p:nvSpPr>
+        <p:spPr>
+          <a:xfrm>
+            <a:off x="749258" y="136590"/>
+            <a:ext cx="7933016" cy="648072"/>
+          </a:xfrm>
+        </p:spPr>
+        <p:txBody>
+          <a:bodyPr/>
+          <a:lstStyle/>
+          <a:p>
+            <a:r>
+              <a:rPr lang="fr-CA" sz="3600" cap="none">
+                <a:solidFill>
+                  <a:srgbClr val="FF0000"/>
+                </a:solidFill>
+                <a:cs typeface="Arial"/>
+              </a:rPr>
+              <a:t>HERITAGE </a:t>
+            </a:r>
+            <a:endParaRPr lang="fr-FR"/>
+          </a:p>
+        </p:txBody>
+      </p:sp>
+      <p:pic>
+        <p:nvPicPr>
+          <p:cNvPr id="3" name="Image 1"/>
+          <p:cNvPicPr>
+            <a:picLocks noChangeAspect="1"/>
+          </p:cNvPicPr>
+          <p:nvPr/>
+        </p:nvPicPr>
+        <p:blipFill>
+          <a:blip r:embed="rId2">
+            <a:extLst>
+              <a:ext uri="{28A0092B-C50C-407E-A947-70E740481C1C}">
+                <a14:useLocalDpi xmlns:a14="http://schemas.microsoft.com/office/drawing/2010/main" val="0"/>
+              </a:ext>
+            </a:extLst>
+          </a:blip>
+          <a:srcRect/>
+          <a:stretch>
+            <a:fillRect/>
+          </a:stretch>
+        </p:blipFill>
+        <p:spPr bwMode="auto">
+          <a:xfrm>
+            <a:off x="65088" y="6400800"/>
+            <a:ext cx="1554162" cy="396875"/>
+          </a:xfrm>
+          <a:prstGeom prst="rect">
+            <a:avLst/>
+          </a:prstGeom>
+          <a:noFill/>
+          <a:ln>
+            <a:noFill/>
+          </a:ln>
+          <a:extLst>
+            <a:ext uri="{909E8E84-426E-40DD-AFC4-6F175D3DCCD1}">
+              <a14:hiddenFill xmlns:a14="http://schemas.microsoft.com/office/drawing/2010/main">
+                <a:solidFill>
+                  <a:srgbClr val="FFFFFF"/>
+                </a:solidFill>
+              </a14:hiddenFill>
+            </a:ext>
+            <a:ext uri="{91240B29-F687-4F45-9708-019B960494DF}">
+              <a14:hiddenLine xmlns:a14="http://schemas.microsoft.com/office/drawing/2010/main" w="9525">
+                <a:solidFill>
+                  <a:srgbClr val="000000"/>
+                </a:solidFill>
+                <a:miter lim="800000"/>
+                <a:headEnd/>
+                <a:tailEnd/>
+              </a14:hiddenLine>
+            </a:ext>
+          </a:extLst>
+        </p:spPr>
+      </p:pic>
+      <p:sp>
+        <p:nvSpPr>
+          <p:cNvPr id="6" name="ZoneTexte 5">
+            <a:extLst>
+              <a:ext uri="{FF2B5EF4-FFF2-40B4-BE49-F238E27FC236}">
+                <a16:creationId xmlns:a16="http://schemas.microsoft.com/office/drawing/2014/main" id="{B2F8B59F-B102-7155-58EA-6E5E871649E6}"/>
+              </a:ext>
+            </a:extLst>
+          </p:cNvPr>
+          <p:cNvSpPr txBox="1"/>
+          <p:nvPr/>
+        </p:nvSpPr>
+        <p:spPr>
+          <a:xfrm>
+            <a:off x="1035727" y="933600"/>
+            <a:ext cx="2165985" cy="830997"/>
+          </a:xfrm>
+          <a:prstGeom prst="rect">
+            <a:avLst/>
+          </a:prstGeom>
+          <a:noFill/>
+        </p:spPr>
+        <p:txBody>
+          <a:bodyPr rot="0" spcFirstLastPara="0" vertOverflow="overflow" horzOverflow="overflow" vert="horz" wrap="square" lIns="91440" tIns="45720" rIns="91440" bIns="45720" numCol="1" spcCol="0" rtlCol="0" fromWordArt="0" anchor="t" anchorCtr="0" forceAA="0" compatLnSpc="1">
+            <a:prstTxWarp prst="textNoShape">
+              <a:avLst/>
+            </a:prstTxWarp>
+            <a:spAutoFit/>
+          </a:bodyPr>
+          <a:lstStyle/>
+          <a:p>
+            <a:pPr marL="342900" indent="-342900" algn="just">
+              <a:buFont typeface="Wingdings"/>
+              <a:buChar char="q"/>
+            </a:pPr>
+            <a:r>
+              <a:rPr lang="fr-FR" sz="2400" dirty="0">
+                <a:solidFill>
+                  <a:srgbClr val="FF0000"/>
+                </a:solidFill>
+                <a:latin typeface="Arial"/>
+                <a:ea typeface="ＭＳ Ｐゴシック"/>
+                <a:cs typeface="Arial"/>
+              </a:rPr>
+              <a:t>Syntaxe</a:t>
+            </a:r>
+            <a:endParaRPr lang="fr-FR" sz="2400" dirty="0">
+              <a:solidFill>
+                <a:srgbClr val="FF0000"/>
+              </a:solidFill>
+              <a:cs typeface="Arial"/>
+            </a:endParaRPr>
+          </a:p>
+          <a:p>
+            <a:endParaRPr lang="fr-FR" sz="2400">
+              <a:latin typeface="Helvetica"/>
+              <a:cs typeface="Helvetica"/>
+            </a:endParaRPr>
+          </a:p>
+        </p:txBody>
+      </p:sp>
+      <p:graphicFrame>
+        <p:nvGraphicFramePr>
+          <p:cNvPr id="4" name="Tableau 4">
+            <a:extLst>
+              <a:ext uri="{FF2B5EF4-FFF2-40B4-BE49-F238E27FC236}">
+                <a16:creationId xmlns:a16="http://schemas.microsoft.com/office/drawing/2014/main" id="{C1B34EE6-CBC9-1010-FADE-D37F38E84725}"/>
+              </a:ext>
+            </a:extLst>
+          </p:cNvPr>
+          <p:cNvGraphicFramePr>
+            <a:graphicFrameLocks noGrp="1"/>
+          </p:cNvGraphicFramePr>
+          <p:nvPr>
+            <p:extLst>
+              <p:ext uri="{D42A27DB-BD31-4B8C-83A1-F6EECF244321}">
+                <p14:modId xmlns:p14="http://schemas.microsoft.com/office/powerpoint/2010/main" val="2512080169"/>
+              </p:ext>
+            </p:extLst>
+          </p:nvPr>
+        </p:nvGraphicFramePr>
+        <p:xfrm>
+          <a:off x="1315370" y="1839100"/>
+          <a:ext cx="6250530" cy="3931920"/>
+        </p:xfrm>
+        <a:graphic>
+          <a:graphicData uri="http://schemas.openxmlformats.org/drawingml/2006/table">
+            <a:tbl>
+              <a:tblPr firstRow="1" bandRow="1">
+                <a:tableStyleId>{5C22544A-7EE6-4342-B048-85BDC9FD1C3A}</a:tableStyleId>
+              </a:tblPr>
+              <a:tblGrid>
+                <a:gridCol w="6250530">
+                  <a:extLst>
+                    <a:ext uri="{9D8B030D-6E8A-4147-A177-3AD203B41FA5}">
+                      <a16:colId xmlns:a16="http://schemas.microsoft.com/office/drawing/2014/main" val="2502537242"/>
+                    </a:ext>
+                  </a:extLst>
+                </a:gridCol>
+              </a:tblGrid>
+              <a:tr h="1064561">
+                <a:tc>
+                  <a:txBody>
+                    <a:bodyPr/>
+                    <a:lstStyle/>
+                    <a:p>
+                      <a:r>
+                        <a:rPr lang="fr-FR" sz="2800" dirty="0">
+                          <a:solidFill>
+                            <a:srgbClr val="FF0000"/>
+                          </a:solidFill>
+                        </a:rPr>
+                        <a:t>class </a:t>
+                      </a:r>
+                      <a:r>
+                        <a:rPr lang="fr-FR" sz="2800" dirty="0"/>
+                        <a:t>Moto </a:t>
+                      </a:r>
+                      <a:r>
+                        <a:rPr lang="fr-FR" sz="2800" dirty="0" err="1">
+                          <a:solidFill>
+                            <a:srgbClr val="FF0000"/>
+                          </a:solidFill>
+                        </a:rPr>
+                        <a:t>extends</a:t>
+                      </a:r>
+                      <a:r>
+                        <a:rPr lang="fr-FR" sz="2800" dirty="0">
+                          <a:solidFill>
+                            <a:srgbClr val="FF0000"/>
+                          </a:solidFill>
+                        </a:rPr>
+                        <a:t> </a:t>
+                      </a:r>
+                      <a:r>
+                        <a:rPr lang="fr-FR" sz="2800" dirty="0" err="1"/>
+                        <a:t>Vehicule</a:t>
+                      </a:r>
+                      <a:r>
+                        <a:rPr lang="fr-FR" sz="2800" dirty="0"/>
+                        <a:t> {</a:t>
+                      </a:r>
+                    </a:p>
+                    <a:p>
+                      <a:pPr lvl="0">
+                        <a:buNone/>
+                      </a:pPr>
+                      <a:endParaRPr lang="fr-FR" sz="2800" dirty="0"/>
+                    </a:p>
+                    <a:p>
+                      <a:pPr lvl="0">
+                        <a:buNone/>
+                      </a:pPr>
+                      <a:endParaRPr lang="fr-FR" sz="2800" dirty="0"/>
+                    </a:p>
+                    <a:p>
+                      <a:pPr lvl="0">
+                        <a:buNone/>
+                      </a:pPr>
+                      <a:r>
+                        <a:rPr lang="fr-FR" sz="2800" dirty="0"/>
+                        <a:t>}</a:t>
+                      </a:r>
+                    </a:p>
+                    <a:p>
+                      <a:pPr lvl="0">
+                        <a:buNone/>
+                      </a:pPr>
+                      <a:endParaRPr lang="fr-FR" sz="2800" dirty="0"/>
+                    </a:p>
+                    <a:p>
+                      <a:pPr lvl="0">
+                        <a:buNone/>
+                      </a:pPr>
+                      <a:r>
+                        <a:rPr lang="fr-FR" sz="2800" b="1" i="0" u="none" strike="noStrike" noProof="0" dirty="0">
+                          <a:solidFill>
+                            <a:srgbClr val="FF0000"/>
+                          </a:solidFill>
+                          <a:latin typeface="Trebuchet MS"/>
+                        </a:rPr>
+                        <a:t>class </a:t>
+                      </a:r>
+                      <a:r>
+                        <a:rPr lang="fr-FR" sz="2800" b="1" i="0" u="none" strike="noStrike" noProof="0" dirty="0">
+                          <a:latin typeface="Trebuchet MS"/>
+                        </a:rPr>
+                        <a:t>Voiture  </a:t>
+                      </a:r>
+                      <a:r>
+                        <a:rPr lang="fr-FR" sz="2800" b="1" i="0" u="none" strike="noStrike" noProof="0" err="1">
+                          <a:solidFill>
+                            <a:srgbClr val="FF0000"/>
+                          </a:solidFill>
+                          <a:latin typeface="Trebuchet MS"/>
+                        </a:rPr>
+                        <a:t>extends</a:t>
+                      </a:r>
+                      <a:r>
+                        <a:rPr lang="fr-FR" sz="2800" b="1" i="0" u="none" strike="noStrike" noProof="0" dirty="0">
+                          <a:solidFill>
+                            <a:srgbClr val="FF0000"/>
+                          </a:solidFill>
+                          <a:latin typeface="Trebuchet MS"/>
+                        </a:rPr>
+                        <a:t> </a:t>
+                      </a:r>
+                      <a:r>
+                        <a:rPr lang="fr-FR" sz="2800" b="1" i="0" u="none" strike="noStrike" noProof="0" err="1">
+                          <a:latin typeface="Trebuchet MS"/>
+                        </a:rPr>
+                        <a:t>Vehicule</a:t>
+                      </a:r>
+                      <a:r>
+                        <a:rPr lang="fr-FR" sz="2800" b="1" i="0" u="none" strike="noStrike" noProof="0" dirty="0">
+                          <a:latin typeface="Trebuchet MS"/>
+                        </a:rPr>
+                        <a:t> {</a:t>
+                      </a:r>
+                      <a:endParaRPr lang="en-US" sz="2800" b="1" i="0" u="none" strike="noStrike" noProof="0">
+                        <a:latin typeface="Trebuchet MS"/>
+                      </a:endParaRPr>
+                    </a:p>
+                    <a:p>
+                      <a:pPr lvl="0">
+                        <a:buNone/>
+                      </a:pPr>
+                      <a:endParaRPr lang="fr-FR" sz="2800" b="1" i="0" u="none" strike="noStrike" noProof="0" dirty="0">
+                        <a:latin typeface="Trebuchet MS"/>
+                      </a:endParaRPr>
+                    </a:p>
+                    <a:p>
+                      <a:pPr lvl="0">
+                        <a:buNone/>
+                      </a:pPr>
+                      <a:endParaRPr lang="fr-FR" sz="2800" b="1" i="0" u="none" strike="noStrike" noProof="0" dirty="0">
+                        <a:latin typeface="Trebuchet MS"/>
+                      </a:endParaRPr>
+                    </a:p>
+                    <a:p>
+                      <a:pPr lvl="0">
+                        <a:buNone/>
+                      </a:pPr>
+                      <a:r>
+                        <a:rPr lang="fr-FR" sz="2800" b="1" i="0" u="none" strike="noStrike" noProof="0" dirty="0">
+                          <a:latin typeface="Trebuchet MS"/>
+                        </a:rPr>
+                        <a:t>}</a:t>
+                      </a:r>
+                      <a:endParaRPr lang="fr-FR" sz="2800" dirty="0"/>
+                    </a:p>
+                  </a:txBody>
+                  <a:tcPr>
+                    <a:solidFill>
+                      <a:schemeClr val="tx1"/>
+                    </a:solidFill>
+                  </a:tcPr>
+                </a:tc>
+                <a:extLst>
+                  <a:ext uri="{0D108BD9-81ED-4DB2-BD59-A6C34878D82A}">
+                    <a16:rowId xmlns:a16="http://schemas.microsoft.com/office/drawing/2014/main" val="2272858583"/>
+                  </a:ext>
+                </a:extLst>
+              </a:tr>
+            </a:tbl>
+          </a:graphicData>
+        </a:graphic>
+      </p:graphicFrame>
+    </p:spTree>
+    <p:extLst>
+      <p:ext uri="{BB962C8B-B14F-4D97-AF65-F5344CB8AC3E}">
+        <p14:creationId xmlns:p14="http://schemas.microsoft.com/office/powerpoint/2010/main" val="2229312640"/>
+      </p:ext>
+    </p:extLst>
+  </p:cSld>
+  <p:clrMapOvr>
+    <a:masterClrMapping/>
+  </p:clrMapOvr>
+  <p:transition spd="slow">
+    <p:wipe/>
+  </p:transition>
+</p:sld>
+</file>
+
+<file path=ppt/slides/slide17.xml><?xml version="1.0" encoding="utf-8"?>
+<p:sld xmlns:a="http://schemas.openxmlformats.org/drawingml/2006/main" xmlns:r="http://schemas.openxmlformats.org/officeDocument/2006/relationships" xmlns:p="http://schemas.openxmlformats.org/presentationml/2006/main">
+  <p:cSld>
+    <p:spTree>
+      <p:nvGrpSpPr>
+        <p:cNvPr id="1" name=""/>
+        <p:cNvGrpSpPr/>
+        <p:nvPr/>
+      </p:nvGrpSpPr>
+      <p:grpSpPr>
+        <a:xfrm>
+          <a:off x="0" y="0"/>
+          <a:ext cx="0" cy="0"/>
+          <a:chOff x="0" y="0"/>
+          <a:chExt cx="0" cy="0"/>
+        </a:xfrm>
+      </p:grpSpPr>
+      <p:sp>
+        <p:nvSpPr>
+          <p:cNvPr id="2" name="Titre 1"/>
+          <p:cNvSpPr>
+            <a:spLocks noGrp="1"/>
+          </p:cNvSpPr>
+          <p:nvPr>
+            <p:ph type="title"/>
+          </p:nvPr>
+        </p:nvSpPr>
+        <p:spPr/>
+        <p:txBody>
+          <a:bodyPr/>
+          <a:lstStyle/>
+          <a:p>
+            <a:r>
+              <a:rPr lang="fr-CA" sz="3600" cap="none" dirty="0">
+                <a:solidFill>
+                  <a:srgbClr val="FF0000"/>
+                </a:solidFill>
+                <a:cs typeface="Arial"/>
+              </a:rPr>
+              <a:t>HERITAGE </a:t>
+            </a:r>
+            <a:endParaRPr lang="fr-FR" dirty="0"/>
+          </a:p>
+        </p:txBody>
+      </p:sp>
+      <p:sp>
+        <p:nvSpPr>
+          <p:cNvPr id="12" name="Espace réservé du contenu 11">
+            <a:extLst>
+              <a:ext uri="{FF2B5EF4-FFF2-40B4-BE49-F238E27FC236}">
+                <a16:creationId xmlns:a16="http://schemas.microsoft.com/office/drawing/2014/main" id="{2257AA88-E51B-077F-4414-A752F4C240A8}"/>
+              </a:ext>
+            </a:extLst>
+          </p:cNvPr>
+          <p:cNvSpPr>
+            <a:spLocks noGrp="1"/>
+          </p:cNvSpPr>
+          <p:nvPr>
+            <p:ph sz="half" idx="1"/>
+          </p:nvPr>
+        </p:nvSpPr>
+        <p:spPr/>
+        <p:style>
+          <a:lnRef idx="1">
+            <a:schemeClr val="accent6"/>
+          </a:lnRef>
+          <a:fillRef idx="2">
+            <a:schemeClr val="accent6"/>
+          </a:fillRef>
+          <a:effectRef idx="1">
+            <a:schemeClr val="accent6"/>
+          </a:effectRef>
+          <a:fontRef idx="minor">
+            <a:schemeClr val="dk1"/>
+          </a:fontRef>
+        </p:style>
+        <p:txBody>
+          <a:bodyPr/>
+          <a:lstStyle/>
+          <a:p>
+            <a:pPr>
+              <a:buNone/>
+            </a:pPr>
+            <a:r>
+              <a:rPr lang="fr-FR" sz="2000" b="1" dirty="0">
+                <a:solidFill>
+                  <a:srgbClr val="0070C0"/>
+                </a:solidFill>
+                <a:latin typeface="Arial"/>
+                <a:cs typeface="Arial"/>
+              </a:rPr>
+              <a:t>Héritage multiniveau</a:t>
+            </a:r>
+            <a:endParaRPr lang="fr-FR" sz="2000" b="1" dirty="0">
+              <a:ea typeface="+mn-lt"/>
+              <a:cs typeface="+mn-lt"/>
+            </a:endParaRPr>
+          </a:p>
+          <a:p>
+            <a:pPr marL="0" indent="0">
+              <a:buNone/>
+            </a:pPr>
+            <a:endParaRPr lang="fr-FR" sz="2000" dirty="0"/>
+          </a:p>
+        </p:txBody>
+      </p:sp>
+      <p:sp>
+        <p:nvSpPr>
+          <p:cNvPr id="13" name="Espace réservé du contenu 12">
+            <a:extLst>
+              <a:ext uri="{FF2B5EF4-FFF2-40B4-BE49-F238E27FC236}">
+                <a16:creationId xmlns:a16="http://schemas.microsoft.com/office/drawing/2014/main" id="{985347E4-9C18-7802-BBD2-CB2C6C9A3A0E}"/>
+              </a:ext>
+            </a:extLst>
+          </p:cNvPr>
+          <p:cNvSpPr>
+            <a:spLocks noGrp="1"/>
+          </p:cNvSpPr>
+          <p:nvPr>
+            <p:ph sz="half" idx="2"/>
+          </p:nvPr>
+        </p:nvSpPr>
+        <p:spPr/>
+        <p:style>
+          <a:lnRef idx="1">
+            <a:schemeClr val="accent6"/>
+          </a:lnRef>
+          <a:fillRef idx="2">
+            <a:schemeClr val="accent6"/>
+          </a:fillRef>
+          <a:effectRef idx="1">
+            <a:schemeClr val="accent6"/>
+          </a:effectRef>
+          <a:fontRef idx="minor">
+            <a:schemeClr val="dk1"/>
+          </a:fontRef>
+        </p:style>
+        <p:txBody>
+          <a:bodyPr/>
+          <a:lstStyle/>
+          <a:p>
+            <a:pPr marL="0" indent="0">
+              <a:buNone/>
+            </a:pPr>
+            <a:r>
+              <a:rPr lang="fr-FR" sz="2000" b="1" dirty="0">
+                <a:solidFill>
+                  <a:srgbClr val="0070C0"/>
+                </a:solidFill>
+                <a:latin typeface="Arial"/>
+                <a:cs typeface="Arial"/>
+              </a:rPr>
+              <a:t>        Héritage hiérarchique</a:t>
+            </a:r>
+            <a:endParaRPr lang="fr-FR" sz="2000" b="1" dirty="0" err="1">
+              <a:ea typeface="+mn-lt"/>
+              <a:cs typeface="+mn-lt"/>
+            </a:endParaRPr>
+          </a:p>
+          <a:p>
+            <a:endParaRPr lang="fr-FR" sz="2400" dirty="0"/>
+          </a:p>
+        </p:txBody>
+      </p:sp>
+      <p:pic>
+        <p:nvPicPr>
+          <p:cNvPr id="3" name="Image 1"/>
+          <p:cNvPicPr>
+            <a:picLocks noChangeAspect="1"/>
+          </p:cNvPicPr>
+          <p:nvPr/>
+        </p:nvPicPr>
+        <p:blipFill>
+          <a:blip r:embed="rId2">
+            <a:extLst>
+              <a:ext uri="{28A0092B-C50C-407E-A947-70E740481C1C}">
+                <a14:useLocalDpi xmlns:a14="http://schemas.microsoft.com/office/drawing/2010/main" val="0"/>
+              </a:ext>
+            </a:extLst>
+          </a:blip>
+          <a:srcRect/>
+          <a:stretch>
+            <a:fillRect/>
+          </a:stretch>
+        </p:blipFill>
+        <p:spPr bwMode="auto">
+          <a:xfrm>
+            <a:off x="65088" y="6400800"/>
+            <a:ext cx="1554162" cy="396875"/>
+          </a:xfrm>
+          <a:prstGeom prst="rect">
+            <a:avLst/>
+          </a:prstGeom>
+          <a:noFill/>
+          <a:ln>
+            <a:noFill/>
+          </a:ln>
+          <a:extLst>
+            <a:ext uri="{909E8E84-426E-40DD-AFC4-6F175D3DCCD1}">
+              <a14:hiddenFill xmlns:a14="http://schemas.microsoft.com/office/drawing/2010/main">
+                <a:solidFill>
+                  <a:srgbClr val="FFFFFF"/>
+                </a:solidFill>
+              </a14:hiddenFill>
+            </a:ext>
+            <a:ext uri="{91240B29-F687-4F45-9708-019B960494DF}">
+              <a14:hiddenLine xmlns:a14="http://schemas.microsoft.com/office/drawing/2010/main" w="9525">
+                <a:solidFill>
+                  <a:srgbClr val="000000"/>
+                </a:solidFill>
+                <a:miter lim="800000"/>
+                <a:headEnd/>
+                <a:tailEnd/>
+              </a14:hiddenLine>
+            </a:ext>
+          </a:extLst>
+        </p:spPr>
+      </p:pic>
+      <p:sp>
+        <p:nvSpPr>
+          <p:cNvPr id="6" name="ZoneTexte 5">
+            <a:extLst>
+              <a:ext uri="{FF2B5EF4-FFF2-40B4-BE49-F238E27FC236}">
+                <a16:creationId xmlns:a16="http://schemas.microsoft.com/office/drawing/2014/main" id="{B2F8B59F-B102-7155-58EA-6E5E871649E6}"/>
+              </a:ext>
+            </a:extLst>
+          </p:cNvPr>
+          <p:cNvSpPr txBox="1"/>
+          <p:nvPr/>
+        </p:nvSpPr>
+        <p:spPr>
+          <a:xfrm>
+            <a:off x="1035727" y="959875"/>
+            <a:ext cx="3111915" cy="461665"/>
+          </a:xfrm>
+          <a:prstGeom prst="rect">
+            <a:avLst/>
+          </a:prstGeom>
+          <a:noFill/>
+        </p:spPr>
+        <p:txBody>
+          <a:bodyPr rot="0" spcFirstLastPara="0" vertOverflow="overflow" horzOverflow="overflow" vert="horz" wrap="square" lIns="91440" tIns="45720" rIns="91440" bIns="45720" numCol="1" spcCol="0" rtlCol="0" fromWordArt="0" anchor="t" anchorCtr="0" forceAA="0" compatLnSpc="1">
+            <a:prstTxWarp prst="textNoShape">
+              <a:avLst/>
+            </a:prstTxWarp>
+            <a:spAutoFit/>
+          </a:bodyPr>
+          <a:lstStyle/>
+          <a:p>
+            <a:pPr marL="342900" indent="-342900" algn="just">
+              <a:buFont typeface="Wingdings"/>
+              <a:buChar char="q"/>
+            </a:pPr>
+            <a:r>
+              <a:rPr lang="fr-FR" sz="2400" dirty="0">
+                <a:solidFill>
+                  <a:srgbClr val="FF0000"/>
+                </a:solidFill>
+                <a:latin typeface="Arial"/>
+                <a:ea typeface="ＭＳ Ｐゴシック"/>
+                <a:cs typeface="Arial"/>
+              </a:rPr>
+              <a:t>Types d'héritages</a:t>
+            </a:r>
+            <a:endParaRPr lang="fr-FR" sz="2400" dirty="0">
+              <a:solidFill>
+                <a:srgbClr val="FF0000"/>
+              </a:solidFill>
+              <a:cs typeface="Arial"/>
+            </a:endParaRPr>
+          </a:p>
+        </p:txBody>
+      </p:sp>
+      <p:sp>
+        <p:nvSpPr>
+          <p:cNvPr id="14" name="ZoneTexte 13">
+            <a:extLst>
+              <a:ext uri="{FF2B5EF4-FFF2-40B4-BE49-F238E27FC236}">
+                <a16:creationId xmlns:a16="http://schemas.microsoft.com/office/drawing/2014/main" id="{F4D456BD-8661-B9B3-9DD1-2BAE7AECCCEE}"/>
+              </a:ext>
+            </a:extLst>
+          </p:cNvPr>
+          <p:cNvSpPr txBox="1"/>
+          <p:nvPr/>
+        </p:nvSpPr>
+        <p:spPr>
+          <a:xfrm>
+            <a:off x="775137" y="2391103"/>
+            <a:ext cx="1208689" cy="369332"/>
+          </a:xfrm>
+          <a:prstGeom prst="rect">
+            <a:avLst/>
+          </a:prstGeom>
+        </p:spPr>
+        <p:style>
+          <a:lnRef idx="2">
+            <a:schemeClr val="dk1"/>
+          </a:lnRef>
+          <a:fillRef idx="1">
+            <a:schemeClr val="lt1"/>
+          </a:fillRef>
+          <a:effectRef idx="0">
+            <a:schemeClr val="dk1"/>
+          </a:effectRef>
+          <a:fontRef idx="minor">
+            <a:schemeClr val="dk1"/>
+          </a:fontRef>
+        </p:style>
+        <p:txBody>
+          <a:bodyPr rot="0" spcFirstLastPara="0" vertOverflow="overflow" horzOverflow="overflow" vert="horz" wrap="square" lIns="91440" tIns="45720" rIns="91440" bIns="45720" numCol="1" spcCol="0" rtlCol="0" fromWordArt="0" anchor="t" anchorCtr="0" forceAA="0" compatLnSpc="1">
+            <a:prstTxWarp prst="textNoShape">
+              <a:avLst/>
+            </a:prstTxWarp>
+            <a:spAutoFit/>
+          </a:bodyPr>
+          <a:lstStyle/>
+          <a:p>
+            <a:r>
+              <a:rPr lang="fr-FR" b="1" dirty="0">
+                <a:latin typeface="Arial"/>
+                <a:ea typeface="ＭＳ Ｐゴシック"/>
+                <a:cs typeface="Arial"/>
+              </a:rPr>
+              <a:t>Class A</a:t>
+            </a:r>
+          </a:p>
+        </p:txBody>
+      </p:sp>
+      <p:sp>
+        <p:nvSpPr>
+          <p:cNvPr id="15" name="ZoneTexte 14">
+            <a:extLst>
+              <a:ext uri="{FF2B5EF4-FFF2-40B4-BE49-F238E27FC236}">
+                <a16:creationId xmlns:a16="http://schemas.microsoft.com/office/drawing/2014/main" id="{06B802B0-C2FE-CE94-9BDA-A02BA752D6D0}"/>
+              </a:ext>
+            </a:extLst>
+          </p:cNvPr>
+          <p:cNvSpPr txBox="1"/>
+          <p:nvPr/>
+        </p:nvSpPr>
+        <p:spPr>
+          <a:xfrm>
+            <a:off x="748862" y="3428999"/>
+            <a:ext cx="1261240" cy="369332"/>
+          </a:xfrm>
+          <a:prstGeom prst="rect">
+            <a:avLst/>
+          </a:prstGeom>
+        </p:spPr>
+        <p:style>
+          <a:lnRef idx="2">
+            <a:schemeClr val="dk1"/>
+          </a:lnRef>
+          <a:fillRef idx="1">
+            <a:schemeClr val="lt1"/>
+          </a:fillRef>
+          <a:effectRef idx="0">
+            <a:schemeClr val="dk1"/>
+          </a:effectRef>
+          <a:fontRef idx="minor">
+            <a:schemeClr val="dk1"/>
+          </a:fontRef>
+        </p:style>
+        <p:txBody>
+          <a:bodyPr rot="0" spcFirstLastPara="0" vertOverflow="overflow" horzOverflow="overflow" vert="horz" wrap="square" lIns="91440" tIns="45720" rIns="91440" bIns="45720" numCol="1" spcCol="0" rtlCol="0" fromWordArt="0" anchor="t" anchorCtr="0" forceAA="0" compatLnSpc="1">
+            <a:prstTxWarp prst="textNoShape">
+              <a:avLst/>
+            </a:prstTxWarp>
+            <a:spAutoFit/>
+          </a:bodyPr>
+          <a:lstStyle/>
+          <a:p>
+            <a:r>
+              <a:rPr lang="fr-FR" b="1" dirty="0">
+                <a:latin typeface="Arial"/>
+                <a:ea typeface="ＭＳ Ｐゴシック"/>
+                <a:cs typeface="Arial"/>
+              </a:rPr>
+              <a:t>Class B</a:t>
+            </a:r>
+            <a:endParaRPr lang="fr-FR" b="1" dirty="0">
+              <a:cs typeface="Arial"/>
+            </a:endParaRPr>
+          </a:p>
+        </p:txBody>
+      </p:sp>
+      <p:sp>
+        <p:nvSpPr>
+          <p:cNvPr id="16" name="ZoneTexte 15">
+            <a:extLst>
+              <a:ext uri="{FF2B5EF4-FFF2-40B4-BE49-F238E27FC236}">
+                <a16:creationId xmlns:a16="http://schemas.microsoft.com/office/drawing/2014/main" id="{2742508D-99EE-EC97-ED94-6136865847C3}"/>
+              </a:ext>
+            </a:extLst>
+          </p:cNvPr>
+          <p:cNvSpPr txBox="1"/>
+          <p:nvPr/>
+        </p:nvSpPr>
+        <p:spPr>
+          <a:xfrm>
+            <a:off x="801413" y="4493171"/>
+            <a:ext cx="1208689" cy="369332"/>
+          </a:xfrm>
+          <a:prstGeom prst="rect">
+            <a:avLst/>
+          </a:prstGeom>
+        </p:spPr>
+        <p:style>
+          <a:lnRef idx="2">
+            <a:schemeClr val="dk1"/>
+          </a:lnRef>
+          <a:fillRef idx="1">
+            <a:schemeClr val="lt1"/>
+          </a:fillRef>
+          <a:effectRef idx="0">
+            <a:schemeClr val="dk1"/>
+          </a:effectRef>
+          <a:fontRef idx="minor">
+            <a:schemeClr val="dk1"/>
+          </a:fontRef>
+        </p:style>
+        <p:txBody>
+          <a:bodyPr rot="0" spcFirstLastPara="0" vertOverflow="overflow" horzOverflow="overflow" vert="horz" wrap="square" lIns="91440" tIns="45720" rIns="91440" bIns="45720" numCol="1" spcCol="0" rtlCol="0" fromWordArt="0" anchor="t" anchorCtr="0" forceAA="0" compatLnSpc="1">
+            <a:prstTxWarp prst="textNoShape">
+              <a:avLst/>
+            </a:prstTxWarp>
+            <a:spAutoFit/>
+          </a:bodyPr>
+          <a:lstStyle/>
+          <a:p>
+            <a:r>
+              <a:rPr lang="fr-FR" b="1" dirty="0">
+                <a:latin typeface="Arial"/>
+                <a:ea typeface="ＭＳ Ｐゴシック"/>
+                <a:cs typeface="Arial"/>
+              </a:rPr>
+              <a:t>Class C</a:t>
+            </a:r>
+            <a:endParaRPr lang="fr-FR" b="1" dirty="0">
+              <a:cs typeface="Arial"/>
+            </a:endParaRPr>
+          </a:p>
+        </p:txBody>
+      </p:sp>
+      <p:cxnSp>
+        <p:nvCxnSpPr>
+          <p:cNvPr id="17" name="Connecteur droit avec flèche 16">
+            <a:extLst>
+              <a:ext uri="{FF2B5EF4-FFF2-40B4-BE49-F238E27FC236}">
+                <a16:creationId xmlns:a16="http://schemas.microsoft.com/office/drawing/2014/main" id="{793A93D9-6085-1614-BABB-BDA82CE5E9F0}"/>
+              </a:ext>
+            </a:extLst>
+          </p:cNvPr>
+          <p:cNvCxnSpPr/>
+          <p:nvPr/>
+        </p:nvCxnSpPr>
+        <p:spPr>
+          <a:xfrm flipH="1" flipV="1">
+            <a:off x="1309521" y="2728419"/>
+            <a:ext cx="5256" cy="701566"/>
+          </a:xfrm>
+          <a:prstGeom prst="straightConnector1">
+            <a:avLst/>
+          </a:prstGeom>
+          <a:ln>
+            <a:tailEnd type="triangle"/>
+          </a:ln>
+        </p:spPr>
+        <p:style>
+          <a:lnRef idx="2">
+            <a:schemeClr val="dk1"/>
+          </a:lnRef>
+          <a:fillRef idx="0">
+            <a:schemeClr val="dk1"/>
+          </a:fillRef>
+          <a:effectRef idx="1">
+            <a:schemeClr val="dk1"/>
+          </a:effectRef>
+          <a:fontRef idx="minor">
+            <a:schemeClr val="tx1"/>
+          </a:fontRef>
+        </p:style>
+      </p:cxnSp>
+      <p:cxnSp>
+        <p:nvCxnSpPr>
+          <p:cNvPr id="18" name="Connecteur droit avec flèche 17">
+            <a:extLst>
+              <a:ext uri="{FF2B5EF4-FFF2-40B4-BE49-F238E27FC236}">
+                <a16:creationId xmlns:a16="http://schemas.microsoft.com/office/drawing/2014/main" id="{4745FBE2-A89A-7187-F45C-8CEC68C49DDD}"/>
+              </a:ext>
+            </a:extLst>
+          </p:cNvPr>
+          <p:cNvCxnSpPr>
+            <a:cxnSpLocks/>
+          </p:cNvCxnSpPr>
+          <p:nvPr/>
+        </p:nvCxnSpPr>
+        <p:spPr>
+          <a:xfrm flipH="1" flipV="1">
+            <a:off x="1309521" y="3792591"/>
+            <a:ext cx="5256" cy="701566"/>
+          </a:xfrm>
+          <a:prstGeom prst="straightConnector1">
+            <a:avLst/>
+          </a:prstGeom>
+          <a:ln>
+            <a:tailEnd type="triangle"/>
+          </a:ln>
+        </p:spPr>
+        <p:style>
+          <a:lnRef idx="2">
+            <a:schemeClr val="dk1"/>
+          </a:lnRef>
+          <a:fillRef idx="0">
+            <a:schemeClr val="dk1"/>
+          </a:fillRef>
+          <a:effectRef idx="1">
+            <a:schemeClr val="dk1"/>
+          </a:effectRef>
+          <a:fontRef idx="minor">
+            <a:schemeClr val="tx1"/>
+          </a:fontRef>
+        </p:style>
+      </p:cxnSp>
+      <p:sp>
+        <p:nvSpPr>
+          <p:cNvPr id="19" name="ZoneTexte 18">
+            <a:extLst>
+              <a:ext uri="{FF2B5EF4-FFF2-40B4-BE49-F238E27FC236}">
+                <a16:creationId xmlns:a16="http://schemas.microsoft.com/office/drawing/2014/main" id="{86B9A464-ABC4-6AFE-ABC9-A0EFFAE6B8BA}"/>
+              </a:ext>
+            </a:extLst>
+          </p:cNvPr>
+          <p:cNvSpPr txBox="1"/>
+          <p:nvPr/>
+        </p:nvSpPr>
+        <p:spPr>
+          <a:xfrm>
+            <a:off x="2772103" y="3428999"/>
+            <a:ext cx="1261240" cy="369332"/>
+          </a:xfrm>
+          <a:prstGeom prst="rect">
+            <a:avLst/>
+          </a:prstGeom>
+        </p:spPr>
+        <p:style>
+          <a:lnRef idx="2">
+            <a:schemeClr val="dk1"/>
+          </a:lnRef>
+          <a:fillRef idx="1">
+            <a:schemeClr val="lt1"/>
+          </a:fillRef>
+          <a:effectRef idx="0">
+            <a:schemeClr val="dk1"/>
+          </a:effectRef>
+          <a:fontRef idx="minor">
+            <a:schemeClr val="dk1"/>
+          </a:fontRef>
+        </p:style>
+        <p:txBody>
+          <a:bodyPr rot="0" spcFirstLastPara="0" vertOverflow="overflow" horzOverflow="overflow" vert="horz" wrap="square" lIns="91440" tIns="45720" rIns="91440" bIns="45720" numCol="1" spcCol="0" rtlCol="0" fromWordArt="0" anchor="t" anchorCtr="0" forceAA="0" compatLnSpc="1">
+            <a:prstTxWarp prst="textNoShape">
+              <a:avLst/>
+            </a:prstTxWarp>
+            <a:spAutoFit/>
+          </a:bodyPr>
+          <a:lstStyle/>
+          <a:p>
+            <a:r>
+              <a:rPr lang="fr-FR" b="1" dirty="0">
+                <a:latin typeface="Arial"/>
+                <a:ea typeface="ＭＳ Ｐゴシック"/>
+                <a:cs typeface="Arial"/>
+              </a:rPr>
+              <a:t>Class A</a:t>
+            </a:r>
+            <a:endParaRPr lang="fr-FR" b="1" dirty="0">
+              <a:cs typeface="Arial"/>
+            </a:endParaRPr>
+          </a:p>
+        </p:txBody>
+      </p:sp>
+      <p:sp>
+        <p:nvSpPr>
+          <p:cNvPr id="20" name="ZoneTexte 19">
+            <a:extLst>
+              <a:ext uri="{FF2B5EF4-FFF2-40B4-BE49-F238E27FC236}">
+                <a16:creationId xmlns:a16="http://schemas.microsoft.com/office/drawing/2014/main" id="{80823589-E538-B7EF-AFAF-BFA71F95AADC}"/>
+              </a:ext>
+            </a:extLst>
+          </p:cNvPr>
+          <p:cNvSpPr txBox="1"/>
+          <p:nvPr/>
+        </p:nvSpPr>
+        <p:spPr>
+          <a:xfrm>
+            <a:off x="2811517" y="4493171"/>
+            <a:ext cx="1261240" cy="369332"/>
+          </a:xfrm>
+          <a:prstGeom prst="rect">
+            <a:avLst/>
+          </a:prstGeom>
+        </p:spPr>
+        <p:style>
+          <a:lnRef idx="2">
+            <a:schemeClr val="dk1"/>
+          </a:lnRef>
+          <a:fillRef idx="1">
+            <a:schemeClr val="lt1"/>
+          </a:fillRef>
+          <a:effectRef idx="0">
+            <a:schemeClr val="dk1"/>
+          </a:effectRef>
+          <a:fontRef idx="minor">
+            <a:schemeClr val="dk1"/>
+          </a:fontRef>
+        </p:style>
+        <p:txBody>
+          <a:bodyPr rot="0" spcFirstLastPara="0" vertOverflow="overflow" horzOverflow="overflow" vert="horz" wrap="square" lIns="91440" tIns="45720" rIns="91440" bIns="45720" numCol="1" spcCol="0" rtlCol="0" fromWordArt="0" anchor="t" anchorCtr="0" forceAA="0" compatLnSpc="1">
+            <a:prstTxWarp prst="textNoShape">
+              <a:avLst/>
+            </a:prstTxWarp>
+            <a:spAutoFit/>
+          </a:bodyPr>
+          <a:lstStyle/>
+          <a:p>
+            <a:r>
+              <a:rPr lang="fr-FR" b="1" dirty="0">
+                <a:latin typeface="Arial"/>
+                <a:ea typeface="ＭＳ Ｐゴシック"/>
+                <a:cs typeface="Arial"/>
+              </a:rPr>
+              <a:t>Class B</a:t>
+            </a:r>
+            <a:endParaRPr lang="fr-FR" b="1" dirty="0">
+              <a:cs typeface="Arial"/>
+            </a:endParaRPr>
+          </a:p>
+        </p:txBody>
+      </p:sp>
+      <p:cxnSp>
+        <p:nvCxnSpPr>
+          <p:cNvPr id="21" name="Connecteur droit avec flèche 20">
+            <a:extLst>
+              <a:ext uri="{FF2B5EF4-FFF2-40B4-BE49-F238E27FC236}">
+                <a16:creationId xmlns:a16="http://schemas.microsoft.com/office/drawing/2014/main" id="{121D964B-D2FF-FBF0-0E14-5A3EDF8319BF}"/>
+              </a:ext>
+            </a:extLst>
+          </p:cNvPr>
+          <p:cNvCxnSpPr>
+            <a:cxnSpLocks/>
+          </p:cNvCxnSpPr>
+          <p:nvPr/>
+        </p:nvCxnSpPr>
+        <p:spPr>
+          <a:xfrm flipH="1" flipV="1">
+            <a:off x="3372176" y="3792591"/>
+            <a:ext cx="5256" cy="701566"/>
+          </a:xfrm>
+          <a:prstGeom prst="straightConnector1">
+            <a:avLst/>
+          </a:prstGeom>
+          <a:ln>
+            <a:tailEnd type="triangle"/>
+          </a:ln>
+        </p:spPr>
+        <p:style>
+          <a:lnRef idx="2">
+            <a:schemeClr val="dk1"/>
+          </a:lnRef>
+          <a:fillRef idx="0">
+            <a:schemeClr val="dk1"/>
+          </a:fillRef>
+          <a:effectRef idx="1">
+            <a:schemeClr val="dk1"/>
+          </a:effectRef>
+          <a:fontRef idx="minor">
+            <a:schemeClr val="tx1"/>
+          </a:fontRef>
+        </p:style>
+      </p:cxnSp>
+      <p:sp>
+        <p:nvSpPr>
+          <p:cNvPr id="24" name="ZoneTexte 23">
+            <a:extLst>
+              <a:ext uri="{FF2B5EF4-FFF2-40B4-BE49-F238E27FC236}">
+                <a16:creationId xmlns:a16="http://schemas.microsoft.com/office/drawing/2014/main" id="{AB0F4301-501D-C191-C5CD-EB9D4E4765CE}"/>
+              </a:ext>
+            </a:extLst>
+          </p:cNvPr>
+          <p:cNvSpPr txBox="1"/>
+          <p:nvPr/>
+        </p:nvSpPr>
+        <p:spPr>
+          <a:xfrm>
+            <a:off x="2377966" y="5018689"/>
+            <a:ext cx="2115204" cy="400110"/>
+          </a:xfrm>
+          <a:prstGeom prst="rect">
+            <a:avLst/>
+          </a:prstGeom>
+          <a:noFill/>
+        </p:spPr>
+        <p:txBody>
+          <a:bodyPr rot="0" spcFirstLastPara="0" vertOverflow="overflow" horzOverflow="overflow" vert="horz" wrap="square" lIns="91440" tIns="45720" rIns="91440" bIns="45720" numCol="1" spcCol="0" rtlCol="0" fromWordArt="0" anchor="t" anchorCtr="0" forceAA="0" compatLnSpc="1">
+            <a:prstTxWarp prst="textNoShape">
+              <a:avLst/>
+            </a:prstTxWarp>
+            <a:spAutoFit/>
+          </a:bodyPr>
+          <a:lstStyle/>
+          <a:p>
+            <a:r>
+              <a:rPr lang="fr-FR" sz="2000" b="1" dirty="0">
+                <a:solidFill>
+                  <a:srgbClr val="0070C0"/>
+                </a:solidFill>
+                <a:latin typeface="Arial"/>
+                <a:ea typeface="ＭＳ Ｐゴシック"/>
+                <a:cs typeface="Arial"/>
+              </a:rPr>
+              <a:t>Héritage Simple</a:t>
+            </a:r>
+          </a:p>
+        </p:txBody>
+      </p:sp>
+      <p:sp>
+        <p:nvSpPr>
+          <p:cNvPr id="25" name="ZoneTexte 24">
+            <a:extLst>
+              <a:ext uri="{FF2B5EF4-FFF2-40B4-BE49-F238E27FC236}">
+                <a16:creationId xmlns:a16="http://schemas.microsoft.com/office/drawing/2014/main" id="{AA2AD97A-C08C-56F6-8806-E8B20CD44D10}"/>
+              </a:ext>
+            </a:extLst>
+          </p:cNvPr>
+          <p:cNvSpPr txBox="1"/>
+          <p:nvPr/>
+        </p:nvSpPr>
+        <p:spPr>
+          <a:xfrm>
+            <a:off x="5990896" y="2391102"/>
+            <a:ext cx="1261240" cy="369332"/>
+          </a:xfrm>
+          <a:prstGeom prst="rect">
+            <a:avLst/>
+          </a:prstGeom>
+        </p:spPr>
+        <p:style>
+          <a:lnRef idx="2">
+            <a:schemeClr val="dk1"/>
+          </a:lnRef>
+          <a:fillRef idx="1">
+            <a:schemeClr val="lt1"/>
+          </a:fillRef>
+          <a:effectRef idx="0">
+            <a:schemeClr val="dk1"/>
+          </a:effectRef>
+          <a:fontRef idx="minor">
+            <a:schemeClr val="dk1"/>
+          </a:fontRef>
+        </p:style>
+        <p:txBody>
+          <a:bodyPr rot="0" spcFirstLastPara="0" vertOverflow="overflow" horzOverflow="overflow" vert="horz" wrap="square" lIns="91440" tIns="45720" rIns="91440" bIns="45720" numCol="1" spcCol="0" rtlCol="0" fromWordArt="0" anchor="t" anchorCtr="0" forceAA="0" compatLnSpc="1">
+            <a:prstTxWarp prst="textNoShape">
+              <a:avLst/>
+            </a:prstTxWarp>
+            <a:spAutoFit/>
+          </a:bodyPr>
+          <a:lstStyle/>
+          <a:p>
+            <a:r>
+              <a:rPr lang="fr-FR" b="1" dirty="0">
+                <a:latin typeface="Arial"/>
+                <a:ea typeface="ＭＳ Ｐゴシック"/>
+                <a:cs typeface="Arial"/>
+              </a:rPr>
+              <a:t>Class B</a:t>
+            </a:r>
+            <a:endParaRPr lang="fr-FR" b="1" dirty="0">
+              <a:cs typeface="Arial"/>
+            </a:endParaRPr>
+          </a:p>
+        </p:txBody>
+      </p:sp>
+      <p:sp>
+        <p:nvSpPr>
+          <p:cNvPr id="26" name="ZoneTexte 25">
+            <a:extLst>
+              <a:ext uri="{FF2B5EF4-FFF2-40B4-BE49-F238E27FC236}">
+                <a16:creationId xmlns:a16="http://schemas.microsoft.com/office/drawing/2014/main" id="{6D46B33C-4560-7F92-A58A-E415387F141A}"/>
+              </a:ext>
+            </a:extLst>
+          </p:cNvPr>
+          <p:cNvSpPr txBox="1"/>
+          <p:nvPr/>
+        </p:nvSpPr>
+        <p:spPr>
+          <a:xfrm>
+            <a:off x="4729654" y="3534102"/>
+            <a:ext cx="1261240" cy="369332"/>
+          </a:xfrm>
+          <a:prstGeom prst="rect">
+            <a:avLst/>
+          </a:prstGeom>
+        </p:spPr>
+        <p:style>
+          <a:lnRef idx="2">
+            <a:schemeClr val="dk1"/>
+          </a:lnRef>
+          <a:fillRef idx="1">
+            <a:schemeClr val="lt1"/>
+          </a:fillRef>
+          <a:effectRef idx="0">
+            <a:schemeClr val="dk1"/>
+          </a:effectRef>
+          <a:fontRef idx="minor">
+            <a:schemeClr val="dk1"/>
+          </a:fontRef>
+        </p:style>
+        <p:txBody>
+          <a:bodyPr rot="0" spcFirstLastPara="0" vertOverflow="overflow" horzOverflow="overflow" vert="horz" wrap="square" lIns="91440" tIns="45720" rIns="91440" bIns="45720" numCol="1" spcCol="0" rtlCol="0" fromWordArt="0" anchor="t" anchorCtr="0" forceAA="0" compatLnSpc="1">
+            <a:prstTxWarp prst="textNoShape">
+              <a:avLst/>
+            </a:prstTxWarp>
+            <a:spAutoFit/>
+          </a:bodyPr>
+          <a:lstStyle/>
+          <a:p>
+            <a:r>
+              <a:rPr lang="fr-FR" b="1" dirty="0">
+                <a:latin typeface="Arial"/>
+                <a:ea typeface="ＭＳ Ｐゴシック"/>
+                <a:cs typeface="Arial"/>
+              </a:rPr>
+              <a:t>Class C</a:t>
+            </a:r>
+            <a:endParaRPr lang="fr-FR" b="1" dirty="0">
+              <a:cs typeface="Arial"/>
+            </a:endParaRPr>
+          </a:p>
+        </p:txBody>
+      </p:sp>
+      <p:sp>
+        <p:nvSpPr>
+          <p:cNvPr id="27" name="ZoneTexte 26">
+            <a:extLst>
+              <a:ext uri="{FF2B5EF4-FFF2-40B4-BE49-F238E27FC236}">
+                <a16:creationId xmlns:a16="http://schemas.microsoft.com/office/drawing/2014/main" id="{95899883-D7E1-F931-39EE-C97C5EBD6272}"/>
+              </a:ext>
+            </a:extLst>
+          </p:cNvPr>
+          <p:cNvSpPr txBox="1"/>
+          <p:nvPr/>
+        </p:nvSpPr>
+        <p:spPr>
+          <a:xfrm>
+            <a:off x="7580585" y="3389584"/>
+            <a:ext cx="1261240" cy="369332"/>
+          </a:xfrm>
+          <a:prstGeom prst="rect">
+            <a:avLst/>
+          </a:prstGeom>
+        </p:spPr>
+        <p:style>
+          <a:lnRef idx="2">
+            <a:schemeClr val="dk1"/>
+          </a:lnRef>
+          <a:fillRef idx="1">
+            <a:schemeClr val="lt1"/>
+          </a:fillRef>
+          <a:effectRef idx="0">
+            <a:schemeClr val="dk1"/>
+          </a:effectRef>
+          <a:fontRef idx="minor">
+            <a:schemeClr val="dk1"/>
+          </a:fontRef>
+        </p:style>
+        <p:txBody>
+          <a:bodyPr rot="0" spcFirstLastPara="0" vertOverflow="overflow" horzOverflow="overflow" vert="horz" wrap="square" lIns="91440" tIns="45720" rIns="91440" bIns="45720" numCol="1" spcCol="0" rtlCol="0" fromWordArt="0" anchor="t" anchorCtr="0" forceAA="0" compatLnSpc="1">
+            <a:prstTxWarp prst="textNoShape">
+              <a:avLst/>
+            </a:prstTxWarp>
+            <a:spAutoFit/>
+          </a:bodyPr>
+          <a:lstStyle/>
+          <a:p>
+            <a:r>
+              <a:rPr lang="fr-FR" b="1" dirty="0">
+                <a:latin typeface="Arial"/>
+                <a:ea typeface="ＭＳ Ｐゴシック"/>
+                <a:cs typeface="Arial"/>
+              </a:rPr>
+              <a:t>Class A</a:t>
+            </a:r>
+            <a:endParaRPr lang="fr-FR" b="1" dirty="0">
+              <a:cs typeface="Arial"/>
+            </a:endParaRPr>
+          </a:p>
+        </p:txBody>
+      </p:sp>
+      <p:sp>
+        <p:nvSpPr>
+          <p:cNvPr id="28" name="ZoneTexte 27">
+            <a:extLst>
+              <a:ext uri="{FF2B5EF4-FFF2-40B4-BE49-F238E27FC236}">
+                <a16:creationId xmlns:a16="http://schemas.microsoft.com/office/drawing/2014/main" id="{B17F772B-208F-EEEE-07B9-BF45CAC950FE}"/>
+              </a:ext>
+            </a:extLst>
+          </p:cNvPr>
+          <p:cNvSpPr txBox="1"/>
+          <p:nvPr/>
+        </p:nvSpPr>
+        <p:spPr>
+          <a:xfrm>
+            <a:off x="5990896" y="4650826"/>
+            <a:ext cx="1261240" cy="369332"/>
+          </a:xfrm>
+          <a:prstGeom prst="rect">
+            <a:avLst/>
+          </a:prstGeom>
+        </p:spPr>
+        <p:style>
+          <a:lnRef idx="2">
+            <a:schemeClr val="dk1"/>
+          </a:lnRef>
+          <a:fillRef idx="1">
+            <a:schemeClr val="lt1"/>
+          </a:fillRef>
+          <a:effectRef idx="0">
+            <a:schemeClr val="dk1"/>
+          </a:effectRef>
+          <a:fontRef idx="minor">
+            <a:schemeClr val="dk1"/>
+          </a:fontRef>
+        </p:style>
+        <p:txBody>
+          <a:bodyPr rot="0" spcFirstLastPara="0" vertOverflow="overflow" horzOverflow="overflow" vert="horz" wrap="square" lIns="91440" tIns="45720" rIns="91440" bIns="45720" numCol="1" spcCol="0" rtlCol="0" fromWordArt="0" anchor="t" anchorCtr="0" forceAA="0" compatLnSpc="1">
+            <a:prstTxWarp prst="textNoShape">
+              <a:avLst/>
+            </a:prstTxWarp>
+            <a:spAutoFit/>
+          </a:bodyPr>
+          <a:lstStyle/>
+          <a:p>
+            <a:r>
+              <a:rPr lang="fr-FR" b="1" dirty="0">
+                <a:latin typeface="Arial"/>
+                <a:ea typeface="ＭＳ Ｐゴシック"/>
+                <a:cs typeface="Arial"/>
+              </a:rPr>
+              <a:t>Class D</a:t>
+            </a:r>
+            <a:endParaRPr lang="fr-FR" b="1" dirty="0">
+              <a:cs typeface="Arial"/>
+            </a:endParaRPr>
+          </a:p>
+        </p:txBody>
+      </p:sp>
+      <p:cxnSp>
+        <p:nvCxnSpPr>
+          <p:cNvPr id="29" name="Connecteur droit avec flèche 28">
+            <a:extLst>
+              <a:ext uri="{FF2B5EF4-FFF2-40B4-BE49-F238E27FC236}">
+                <a16:creationId xmlns:a16="http://schemas.microsoft.com/office/drawing/2014/main" id="{32005542-970A-8AAF-521D-C9FC2DEFAE94}"/>
+              </a:ext>
+            </a:extLst>
+          </p:cNvPr>
+          <p:cNvCxnSpPr>
+            <a:cxnSpLocks/>
+          </p:cNvCxnSpPr>
+          <p:nvPr/>
+        </p:nvCxnSpPr>
+        <p:spPr>
+          <a:xfrm flipV="1">
+            <a:off x="5689708" y="2767833"/>
+            <a:ext cx="388881" cy="767255"/>
+          </a:xfrm>
+          <a:prstGeom prst="straightConnector1">
+            <a:avLst/>
+          </a:prstGeom>
+          <a:ln>
+            <a:tailEnd type="triangle"/>
+          </a:ln>
+        </p:spPr>
+        <p:style>
+          <a:lnRef idx="2">
+            <a:schemeClr val="dk1"/>
+          </a:lnRef>
+          <a:fillRef idx="0">
+            <a:schemeClr val="dk1"/>
+          </a:fillRef>
+          <a:effectRef idx="1">
+            <a:schemeClr val="dk1"/>
+          </a:effectRef>
+          <a:fontRef idx="minor">
+            <a:schemeClr val="tx1"/>
+          </a:fontRef>
+        </p:style>
+      </p:cxnSp>
+      <p:cxnSp>
+        <p:nvCxnSpPr>
+          <p:cNvPr id="30" name="Connecteur droit avec flèche 29">
+            <a:extLst>
+              <a:ext uri="{FF2B5EF4-FFF2-40B4-BE49-F238E27FC236}">
+                <a16:creationId xmlns:a16="http://schemas.microsoft.com/office/drawing/2014/main" id="{8E89C7EB-5CCD-AEB8-7330-974F10F491A1}"/>
+              </a:ext>
+            </a:extLst>
+          </p:cNvPr>
+          <p:cNvCxnSpPr>
+            <a:cxnSpLocks/>
+          </p:cNvCxnSpPr>
+          <p:nvPr/>
+        </p:nvCxnSpPr>
+        <p:spPr>
+          <a:xfrm flipH="1" flipV="1">
+            <a:off x="5605624" y="3897696"/>
+            <a:ext cx="898636" cy="754116"/>
+          </a:xfrm>
+          <a:prstGeom prst="straightConnector1">
+            <a:avLst/>
+          </a:prstGeom>
+          <a:ln>
+            <a:tailEnd type="triangle"/>
+          </a:ln>
+        </p:spPr>
+        <p:style>
+          <a:lnRef idx="2">
+            <a:schemeClr val="dk1"/>
+          </a:lnRef>
+          <a:fillRef idx="0">
+            <a:schemeClr val="dk1"/>
+          </a:fillRef>
+          <a:effectRef idx="1">
+            <a:schemeClr val="dk1"/>
+          </a:effectRef>
+          <a:fontRef idx="minor">
+            <a:schemeClr val="tx1"/>
+          </a:fontRef>
+        </p:style>
+      </p:cxnSp>
+      <p:cxnSp>
+        <p:nvCxnSpPr>
+          <p:cNvPr id="31" name="Connecteur droit avec flèche 30">
+            <a:extLst>
+              <a:ext uri="{FF2B5EF4-FFF2-40B4-BE49-F238E27FC236}">
+                <a16:creationId xmlns:a16="http://schemas.microsoft.com/office/drawing/2014/main" id="{0B5ADF49-5E49-6695-9742-7B2E3EF39034}"/>
+              </a:ext>
+            </a:extLst>
+          </p:cNvPr>
+          <p:cNvCxnSpPr>
+            <a:cxnSpLocks/>
+          </p:cNvCxnSpPr>
+          <p:nvPr/>
+        </p:nvCxnSpPr>
+        <p:spPr>
+          <a:xfrm flipH="1">
+            <a:off x="6932554" y="3771571"/>
+            <a:ext cx="1043153" cy="874983"/>
+          </a:xfrm>
+          <a:prstGeom prst="straightConnector1">
+            <a:avLst/>
+          </a:prstGeom>
+          <a:ln>
+            <a:tailEnd type="triangle"/>
+          </a:ln>
+        </p:spPr>
+        <p:style>
+          <a:lnRef idx="2">
+            <a:schemeClr val="dk1"/>
+          </a:lnRef>
+          <a:fillRef idx="0">
+            <a:schemeClr val="dk1"/>
+          </a:fillRef>
+          <a:effectRef idx="1">
+            <a:schemeClr val="dk1"/>
+          </a:effectRef>
+          <a:fontRef idx="minor">
+            <a:schemeClr val="tx1"/>
+          </a:fontRef>
+        </p:style>
+      </p:cxnSp>
+      <p:cxnSp>
+        <p:nvCxnSpPr>
+          <p:cNvPr id="32" name="Connecteur droit avec flèche 31">
+            <a:extLst>
+              <a:ext uri="{FF2B5EF4-FFF2-40B4-BE49-F238E27FC236}">
+                <a16:creationId xmlns:a16="http://schemas.microsoft.com/office/drawing/2014/main" id="{B370C667-BBF5-3D1E-B0A8-357B8A03B6CD}"/>
+              </a:ext>
+            </a:extLst>
+          </p:cNvPr>
+          <p:cNvCxnSpPr>
+            <a:cxnSpLocks/>
+          </p:cNvCxnSpPr>
+          <p:nvPr/>
+        </p:nvCxnSpPr>
+        <p:spPr>
+          <a:xfrm>
+            <a:off x="6977226" y="2786227"/>
+            <a:ext cx="1124603" cy="585949"/>
+          </a:xfrm>
+          <a:prstGeom prst="straightConnector1">
+            <a:avLst/>
+          </a:prstGeom>
+          <a:ln>
+            <a:tailEnd type="triangle"/>
+          </a:ln>
+        </p:spPr>
+        <p:style>
+          <a:lnRef idx="2">
+            <a:schemeClr val="dk1"/>
+          </a:lnRef>
+          <a:fillRef idx="0">
+            <a:schemeClr val="dk1"/>
+          </a:fillRef>
+          <a:effectRef idx="1">
+            <a:schemeClr val="dk1"/>
+          </a:effectRef>
+          <a:fontRef idx="minor">
+            <a:schemeClr val="tx1"/>
+          </a:fontRef>
+        </p:style>
+      </p:cxnSp>
+    </p:spTree>
+    <p:extLst>
+      <p:ext uri="{BB962C8B-B14F-4D97-AF65-F5344CB8AC3E}">
+        <p14:creationId xmlns:p14="http://schemas.microsoft.com/office/powerpoint/2010/main" val="4094918406"/>
+      </p:ext>
+    </p:extLst>
+  </p:cSld>
+  <p:clrMapOvr>
+    <a:masterClrMapping/>
+  </p:clrMapOvr>
+  <p:transition spd="slow">
+    <p:wipe/>
+  </p:transition>
+</p:sld>
+</file>
+
+<file path=ppt/slides/slide18.xml><?xml version="1.0" encoding="utf-8"?>
+<p:sld xmlns:a="http://schemas.openxmlformats.org/drawingml/2006/main" xmlns:r="http://schemas.openxmlformats.org/officeDocument/2006/relationships" xmlns:p="http://schemas.openxmlformats.org/presentationml/2006/main">
+  <p:cSld>
+    <p:spTree>
+      <p:nvGrpSpPr>
+        <p:cNvPr id="1" name=""/>
+        <p:cNvGrpSpPr/>
+        <p:nvPr/>
+      </p:nvGrpSpPr>
+      <p:grpSpPr>
+        <a:xfrm>
+          <a:off x="0" y="0"/>
+          <a:ext cx="0" cy="0"/>
+          <a:chOff x="0" y="0"/>
+          <a:chExt cx="0" cy="0"/>
+        </a:xfrm>
+      </p:grpSpPr>
+      <p:sp>
+        <p:nvSpPr>
           <p:cNvPr id="4" name="Titre 3"/>
           <p:cNvSpPr>
             <a:spLocks noGrp="1"/>
@@ -5932,7 +7460,7 @@
 </p:sld>
 </file>
 
-<file path=ppt/slides/slide17.xml><?xml version="1.0" encoding="utf-8"?>
+<file path=ppt/slides/slide19.xml><?xml version="1.0" encoding="utf-8"?>
 <p:sld xmlns:a="http://schemas.openxmlformats.org/drawingml/2006/main" xmlns:r="http://schemas.openxmlformats.org/officeDocument/2006/relationships" xmlns:p="http://schemas.openxmlformats.org/presentationml/2006/main">
   <p:cSld>
     <p:spTree>
@@ -6782,8 +8310,8 @@
         </p:nvSpPr>
         <p:spPr>
           <a:xfrm>
-            <a:off x="2369791" y="1004473"/>
-            <a:ext cx="4405797" cy="3785652"/>
+            <a:off x="2369791" y="881363"/>
+            <a:ext cx="4405797" cy="4031873"/>
           </a:xfrm>
           <a:prstGeom prst="rect">
             <a:avLst/>
@@ -6840,7 +8368,22 @@
                 <a:ea typeface="ＭＳ Ｐゴシック"/>
                 <a:cs typeface="Arial"/>
               </a:rPr>
-              <a:t>Notions de bases</a:t>
+              <a:t>Définition</a:t>
+            </a:r>
+            <a:endParaRPr lang="fr-FR" dirty="0"/>
+          </a:p>
+          <a:p>
+            <a:pPr marL="742950" lvl="1" indent="-285750">
+              <a:buFont typeface="Wingdings,Sans-Serif"/>
+              <a:buChar char="q"/>
+            </a:pPr>
+            <a:r>
+              <a:rPr lang="fr-FR" sz="1600" b="1" dirty="0">
+                <a:latin typeface="Arial"/>
+                <a:ea typeface="ＭＳ Ｐゴシック"/>
+                <a:cs typeface="Arial"/>
+              </a:rPr>
+              <a:t>Mots clés</a:t>
             </a:r>
           </a:p>
           <a:p>

</xml_diff>